<commit_message>
minor edits to lectures
</commit_message>
<xml_diff>
--- a/Lectures/In Class/Design Reflections.pptx
+++ b/Lectures/In Class/Design Reflections.pptx
@@ -702,59 +702,6 @@
           </a:p>
         </p:txBody>
       </p:sp>
-      <p:sp>
-        <p:nvSpPr>
-          <p:cNvPr id="11271" name="Rectangle 7"/>
-          <p:cNvSpPr>
-            <a:spLocks noGrp="1" noChangeArrowheads="1"/>
-          </p:cNvSpPr>
-          <p:nvPr>
-            <p:ph type="sldNum" sz="quarter" idx="5"/>
-          </p:nvPr>
-        </p:nvSpPr>
-        <p:spPr bwMode="auto">
-          <a:xfrm>
-            <a:off x="3884613" y="8831263"/>
-            <a:ext cx="2971800" cy="463550"/>
-          </a:xfrm>
-          <a:prstGeom prst="rect">
-            <a:avLst/>
-          </a:prstGeom>
-          <a:noFill/>
-          <a:ln w="9525">
-            <a:noFill/>
-            <a:miter lim="800000"/>
-            <a:headEnd/>
-            <a:tailEnd/>
-          </a:ln>
-          <a:effectLst/>
-        </p:spPr>
-        <p:txBody>
-          <a:bodyPr vert="horz" wrap="square" lIns="92302" tIns="46151" rIns="92302" bIns="46151" numCol="1" anchor="b" anchorCtr="0" compatLnSpc="1">
-            <a:prstTxWarp prst="textNoShape">
-              <a:avLst/>
-            </a:prstTxWarp>
-          </a:bodyPr>
-          <a:lstStyle>
-            <a:lvl1pPr algn="r" defTabSz="923925" eaLnBrk="1" hangingPunct="1">
-              <a:spcBef>
-                <a:spcPct val="0"/>
-              </a:spcBef>
-              <a:defRPr sz="1200">
-                <a:latin typeface="Arial" charset="0"/>
-              </a:defRPr>
-            </a:lvl1pPr>
-          </a:lstStyle>
-          <a:p>
-            <a:fld id="{68131A24-38D8-4CC5-9E6E-A126B09286EB}" type="slidenum">
-              <a:rPr lang="en-US"/>
-              <a:pPr/>
-              <a:t>‹#›</a:t>
-            </a:fld>
-            <a:endParaRPr lang="en-US"/>
-          </a:p>
-        </p:txBody>
-      </p:sp>
     </p:spTree>
     <p:extLst>
       <p:ext uri="{BB962C8B-B14F-4D97-AF65-F5344CB8AC3E}">
@@ -932,7 +879,7 @@
           <a:bodyPr/>
           <a:lstStyle/>
           <a:p>
-            <a:endParaRPr lang="en-US" dirty="0"/>
+            <a:endParaRPr lang="es-HN"/>
           </a:p>
         </p:txBody>
       </p:sp>
@@ -946,7 +893,15 @@
             <p:ph type="sldNum" sz="quarter" idx="10"/>
           </p:nvPr>
         </p:nvSpPr>
-        <p:spPr/>
+        <p:spPr>
+          <a:xfrm>
+            <a:off x="3884613" y="8831263"/>
+            <a:ext cx="2971800" cy="463550"/>
+          </a:xfrm>
+          <a:prstGeom prst="rect">
+            <a:avLst/>
+          </a:prstGeom>
+        </p:spPr>
         <p:txBody>
           <a:bodyPr/>
           <a:lstStyle/>
@@ -954,7 +909,7 @@
             <a:fld id="{68131A24-38D8-4CC5-9E6E-A126B09286EB}" type="slidenum">
               <a:rPr lang="en-US" smtClean="0"/>
               <a:pPr/>
-              <a:t>7</a:t>
+              <a:t>1</a:t>
             </a:fld>
             <a:endParaRPr lang="en-US"/>
           </a:p>
@@ -963,7 +918,7 @@
     </p:spTree>
     <p:extLst>
       <p:ext uri="{BB962C8B-B14F-4D97-AF65-F5344CB8AC3E}">
-        <p14:creationId xmlns:p14="http://schemas.microsoft.com/office/powerpoint/2010/main" val="865728318"/>
+        <p14:creationId xmlns:p14="http://schemas.microsoft.com/office/powerpoint/2010/main" val="2303842223"/>
       </p:ext>
     </p:extLst>
   </p:cSld>
@@ -1017,6 +972,99 @@
           <a:bodyPr/>
           <a:lstStyle/>
           <a:p>
+            <a:endParaRPr lang="en-US" dirty="0"/>
+          </a:p>
+        </p:txBody>
+      </p:sp>
+      <p:sp>
+        <p:nvSpPr>
+          <p:cNvPr id="4" name="Slide Number Placeholder 3"/>
+          <p:cNvSpPr>
+            <a:spLocks noGrp="1"/>
+          </p:cNvSpPr>
+          <p:nvPr>
+            <p:ph type="sldNum" sz="quarter" idx="10"/>
+          </p:nvPr>
+        </p:nvSpPr>
+        <p:spPr>
+          <a:xfrm>
+            <a:off x="3884613" y="8831263"/>
+            <a:ext cx="2971800" cy="463550"/>
+          </a:xfrm>
+          <a:prstGeom prst="rect">
+            <a:avLst/>
+          </a:prstGeom>
+        </p:spPr>
+        <p:txBody>
+          <a:bodyPr/>
+          <a:lstStyle/>
+          <a:p>
+            <a:fld id="{68131A24-38D8-4CC5-9E6E-A126B09286EB}" type="slidenum">
+              <a:rPr lang="en-US" smtClean="0"/>
+              <a:pPr/>
+              <a:t>7</a:t>
+            </a:fld>
+            <a:endParaRPr lang="en-US"/>
+          </a:p>
+        </p:txBody>
+      </p:sp>
+    </p:spTree>
+    <p:extLst>
+      <p:ext uri="{BB962C8B-B14F-4D97-AF65-F5344CB8AC3E}">
+        <p14:creationId xmlns:p14="http://schemas.microsoft.com/office/powerpoint/2010/main" val="865728318"/>
+      </p:ext>
+    </p:extLst>
+  </p:cSld>
+  <p:clrMapOvr>
+    <a:masterClrMapping/>
+  </p:clrMapOvr>
+</p:notes>
+</file>
+
+<file path=ppt/notesSlides/notesSlide3.xml><?xml version="1.0" encoding="utf-8"?>
+<p:notes xmlns:a="http://schemas.openxmlformats.org/drawingml/2006/main" xmlns:r="http://schemas.openxmlformats.org/officeDocument/2006/relationships" xmlns:p="http://schemas.openxmlformats.org/presentationml/2006/main">
+  <p:cSld>
+    <p:spTree>
+      <p:nvGrpSpPr>
+        <p:cNvPr id="1" name=""/>
+        <p:cNvGrpSpPr/>
+        <p:nvPr/>
+      </p:nvGrpSpPr>
+      <p:grpSpPr>
+        <a:xfrm>
+          <a:off x="0" y="0"/>
+          <a:ext cx="0" cy="0"/>
+          <a:chOff x="0" y="0"/>
+          <a:chExt cx="0" cy="0"/>
+        </a:xfrm>
+      </p:grpSpPr>
+      <p:sp>
+        <p:nvSpPr>
+          <p:cNvPr id="2" name="Slide Image Placeholder 1"/>
+          <p:cNvSpPr>
+            <a:spLocks noGrp="1" noRot="1" noChangeAspect="1"/>
+          </p:cNvSpPr>
+          <p:nvPr>
+            <p:ph type="sldImg"/>
+          </p:nvPr>
+        </p:nvSpPr>
+        <p:spPr/>
+      </p:sp>
+      <p:sp>
+        <p:nvSpPr>
+          <p:cNvPr id="3" name="Notes Placeholder 2"/>
+          <p:cNvSpPr>
+            <a:spLocks noGrp="1"/>
+          </p:cNvSpPr>
+          <p:nvPr>
+            <p:ph type="body" idx="1"/>
+          </p:nvPr>
+        </p:nvSpPr>
+        <p:spPr/>
+        <p:txBody>
+          <a:bodyPr/>
+          <a:lstStyle/>
+          <a:p>
             <a:pPr marL="0" marR="0" indent="0" algn="l" defTabSz="914400" rtl="0" eaLnBrk="1" fontAlgn="base" latinLnBrk="0" hangingPunct="1">
               <a:lnSpc>
                 <a:spcPct val="100000"/>
@@ -1183,7 +1231,15 @@
             <p:ph type="sldNum" sz="quarter" idx="10"/>
           </p:nvPr>
         </p:nvSpPr>
-        <p:spPr/>
+        <p:spPr>
+          <a:xfrm>
+            <a:off x="3884613" y="8831263"/>
+            <a:ext cx="2971800" cy="463550"/>
+          </a:xfrm>
+          <a:prstGeom prst="rect">
+            <a:avLst/>
+          </a:prstGeom>
+        </p:spPr>
         <p:txBody>
           <a:bodyPr/>
           <a:lstStyle/>
@@ -1203,88 +1259,6 @@
         <p14:creationId xmlns:p14="http://schemas.microsoft.com/office/powerpoint/2010/main" val="3030143940"/>
       </p:ext>
     </p:extLst>
-  </p:cSld>
-  <p:clrMapOvr>
-    <a:masterClrMapping/>
-  </p:clrMapOvr>
-</p:notes>
-</file>
-
-<file path=ppt/notesSlides/notesSlide3.xml><?xml version="1.0" encoding="utf-8"?>
-<p:notes xmlns:a="http://schemas.openxmlformats.org/drawingml/2006/main" xmlns:r="http://schemas.openxmlformats.org/officeDocument/2006/relationships" xmlns:p="http://schemas.openxmlformats.org/presentationml/2006/main">
-  <p:cSld>
-    <p:spTree>
-      <p:nvGrpSpPr>
-        <p:cNvPr id="1" name=""/>
-        <p:cNvGrpSpPr/>
-        <p:nvPr/>
-      </p:nvGrpSpPr>
-      <p:grpSpPr>
-        <a:xfrm>
-          <a:off x="0" y="0"/>
-          <a:ext cx="0" cy="0"/>
-          <a:chOff x="0" y="0"/>
-          <a:chExt cx="0" cy="0"/>
-        </a:xfrm>
-      </p:grpSpPr>
-      <p:sp>
-        <p:nvSpPr>
-          <p:cNvPr id="2" name="Slide Image Placeholder 1"/>
-          <p:cNvSpPr>
-            <a:spLocks noGrp="1" noRot="1" noChangeAspect="1"/>
-          </p:cNvSpPr>
-          <p:nvPr>
-            <p:ph type="sldImg"/>
-          </p:nvPr>
-        </p:nvSpPr>
-        <p:spPr/>
-      </p:sp>
-      <p:sp>
-        <p:nvSpPr>
-          <p:cNvPr id="3" name="Notes Placeholder 2"/>
-          <p:cNvSpPr>
-            <a:spLocks noGrp="1"/>
-          </p:cNvSpPr>
-          <p:nvPr>
-            <p:ph type="body" idx="1"/>
-          </p:nvPr>
-        </p:nvSpPr>
-        <p:spPr/>
-        <p:txBody>
-          <a:bodyPr>
-            <a:normAutofit/>
-          </a:bodyPr>
-          <a:lstStyle/>
-          <a:p>
-            <a:endParaRPr lang="en-US" dirty="0"/>
-          </a:p>
-        </p:txBody>
-      </p:sp>
-      <p:sp>
-        <p:nvSpPr>
-          <p:cNvPr id="4" name="Slide Number Placeholder 3"/>
-          <p:cNvSpPr>
-            <a:spLocks noGrp="1"/>
-          </p:cNvSpPr>
-          <p:nvPr>
-            <p:ph type="sldNum" sz="quarter" idx="10"/>
-          </p:nvPr>
-        </p:nvSpPr>
-        <p:spPr/>
-        <p:txBody>
-          <a:bodyPr/>
-          <a:lstStyle/>
-          <a:p>
-            <a:fld id="{10DE02E4-A158-45AA-B5D0-F76AD53DDB06}" type="slidenum">
-              <a:rPr lang="en-US" smtClean="0"/>
-              <a:pPr/>
-              <a:t>16</a:t>
-            </a:fld>
-            <a:endParaRPr lang="en-US"/>
-          </a:p>
-        </p:txBody>
-      </p:sp>
-    </p:spTree>
   </p:cSld>
   <p:clrMapOvr>
     <a:masterClrMapping/>
@@ -1333,90 +1307,48 @@
         </p:nvSpPr>
         <p:spPr/>
         <p:txBody>
+          <a:bodyPr>
+            <a:normAutofit/>
+          </a:bodyPr>
+          <a:lstStyle/>
+          <a:p>
+            <a:endParaRPr lang="en-US" dirty="0"/>
+          </a:p>
+        </p:txBody>
+      </p:sp>
+      <p:sp>
+        <p:nvSpPr>
+          <p:cNvPr id="4" name="Slide Number Placeholder 3"/>
+          <p:cNvSpPr>
+            <a:spLocks noGrp="1"/>
+          </p:cNvSpPr>
+          <p:nvPr>
+            <p:ph type="sldNum" sz="quarter" idx="10"/>
+          </p:nvPr>
+        </p:nvSpPr>
+        <p:spPr>
+          <a:xfrm>
+            <a:off x="3884613" y="8831263"/>
+            <a:ext cx="2971800" cy="463550"/>
+          </a:xfrm>
+          <a:prstGeom prst="rect">
+            <a:avLst/>
+          </a:prstGeom>
+        </p:spPr>
+        <p:txBody>
           <a:bodyPr/>
           <a:lstStyle/>
           <a:p>
-            <a:r>
-              <a:rPr lang="en-US" dirty="0" smtClean="0"/>
-              <a:t>Assemble a team!</a:t>
-            </a:r>
-          </a:p>
-          <a:p>
-            <a:r>
-              <a:rPr lang="en-US" dirty="0" smtClean="0"/>
-              <a:t>Humility</a:t>
-            </a:r>
-            <a:r>
-              <a:rPr lang="en-US" baseline="0" dirty="0" smtClean="0"/>
-              <a:t> to acknowledge what you don’t know</a:t>
-            </a:r>
-          </a:p>
-          <a:p>
-            <a:r>
-              <a:rPr lang="en-US" baseline="0" dirty="0" smtClean="0"/>
-              <a:t>Push the edge</a:t>
-            </a:r>
-            <a:endParaRPr lang="en-US" dirty="0" smtClean="0"/>
-          </a:p>
-          <a:p>
-            <a:r>
-              <a:rPr lang="en-US" dirty="0" smtClean="0"/>
-              <a:t>Immerse yourself in the context of the problem</a:t>
-            </a:r>
-          </a:p>
-          <a:p>
-            <a:r>
-              <a:rPr lang="en-US" dirty="0" smtClean="0"/>
-              <a:t>Learn the state of the art theories, but don’t assume they are all correct</a:t>
-            </a:r>
-          </a:p>
-          <a:p>
-            <a:r>
-              <a:rPr lang="en-US" dirty="0" smtClean="0"/>
-              <a:t>Identify the constraints that are preventing advance in an attribute that is important, then break the rules</a:t>
-            </a:r>
-          </a:p>
-          <a:p>
-            <a:r>
-              <a:rPr lang="en-US" dirty="0" smtClean="0"/>
-              <a:t>Beware of places where authors say “it is well known that….” or “standard practice for many years has been…”</a:t>
-            </a:r>
-          </a:p>
-          <a:p>
-            <a:endParaRPr lang="en-US" dirty="0"/>
-          </a:p>
-        </p:txBody>
-      </p:sp>
-      <p:sp>
-        <p:nvSpPr>
-          <p:cNvPr id="4" name="Slide Number Placeholder 3"/>
-          <p:cNvSpPr>
-            <a:spLocks noGrp="1"/>
-          </p:cNvSpPr>
-          <p:nvPr>
-            <p:ph type="sldNum" sz="quarter" idx="10"/>
-          </p:nvPr>
-        </p:nvSpPr>
-        <p:spPr/>
-        <p:txBody>
-          <a:bodyPr/>
-          <a:lstStyle/>
-          <a:p>
-            <a:fld id="{68131A24-38D8-4CC5-9E6E-A126B09286EB}" type="slidenum">
+            <a:fld id="{10DE02E4-A158-45AA-B5D0-F76AD53DDB06}" type="slidenum">
               <a:rPr lang="en-US" smtClean="0"/>
               <a:pPr/>
-              <a:t>20</a:t>
+              <a:t>16</a:t>
             </a:fld>
             <a:endParaRPr lang="en-US"/>
           </a:p>
         </p:txBody>
       </p:sp>
     </p:spTree>
-    <p:extLst>
-      <p:ext uri="{BB962C8B-B14F-4D97-AF65-F5344CB8AC3E}">
-        <p14:creationId xmlns:p14="http://schemas.microsoft.com/office/powerpoint/2010/main" val="1360900344"/>
-      </p:ext>
-    </p:extLst>
   </p:cSld>
   <p:clrMapOvr>
     <a:masterClrMapping/>
@@ -1470,6 +1402,146 @@
           <a:p>
             <a:r>
               <a:rPr lang="en-US" dirty="0" smtClean="0"/>
+              <a:t>Assemble a team!</a:t>
+            </a:r>
+          </a:p>
+          <a:p>
+            <a:r>
+              <a:rPr lang="en-US" dirty="0" smtClean="0"/>
+              <a:t>Humility</a:t>
+            </a:r>
+            <a:r>
+              <a:rPr lang="en-US" baseline="0" dirty="0" smtClean="0"/>
+              <a:t> to acknowledge what you don’t know</a:t>
+            </a:r>
+          </a:p>
+          <a:p>
+            <a:r>
+              <a:rPr lang="en-US" baseline="0" dirty="0" smtClean="0"/>
+              <a:t>Push the edge</a:t>
+            </a:r>
+            <a:endParaRPr lang="en-US" dirty="0" smtClean="0"/>
+          </a:p>
+          <a:p>
+            <a:r>
+              <a:rPr lang="en-US" dirty="0" smtClean="0"/>
+              <a:t>Immerse yourself in the context of the problem</a:t>
+            </a:r>
+          </a:p>
+          <a:p>
+            <a:r>
+              <a:rPr lang="en-US" dirty="0" smtClean="0"/>
+              <a:t>Learn the state of the art theories, but don’t assume they are all correct</a:t>
+            </a:r>
+          </a:p>
+          <a:p>
+            <a:r>
+              <a:rPr lang="en-US" dirty="0" smtClean="0"/>
+              <a:t>Identify the constraints that are preventing advance in an attribute that is important, then break the rules</a:t>
+            </a:r>
+          </a:p>
+          <a:p>
+            <a:r>
+              <a:rPr lang="en-US" dirty="0" smtClean="0"/>
+              <a:t>Beware of places where authors say “it is well known that….” or “standard practice for many years has been…”</a:t>
+            </a:r>
+          </a:p>
+          <a:p>
+            <a:endParaRPr lang="en-US" dirty="0"/>
+          </a:p>
+        </p:txBody>
+      </p:sp>
+      <p:sp>
+        <p:nvSpPr>
+          <p:cNvPr id="4" name="Slide Number Placeholder 3"/>
+          <p:cNvSpPr>
+            <a:spLocks noGrp="1"/>
+          </p:cNvSpPr>
+          <p:nvPr>
+            <p:ph type="sldNum" sz="quarter" idx="10"/>
+          </p:nvPr>
+        </p:nvSpPr>
+        <p:spPr>
+          <a:xfrm>
+            <a:off x="3884613" y="8831263"/>
+            <a:ext cx="2971800" cy="463550"/>
+          </a:xfrm>
+          <a:prstGeom prst="rect">
+            <a:avLst/>
+          </a:prstGeom>
+        </p:spPr>
+        <p:txBody>
+          <a:bodyPr/>
+          <a:lstStyle/>
+          <a:p>
+            <a:fld id="{68131A24-38D8-4CC5-9E6E-A126B09286EB}" type="slidenum">
+              <a:rPr lang="en-US" smtClean="0"/>
+              <a:pPr/>
+              <a:t>20</a:t>
+            </a:fld>
+            <a:endParaRPr lang="en-US"/>
+          </a:p>
+        </p:txBody>
+      </p:sp>
+    </p:spTree>
+    <p:extLst>
+      <p:ext uri="{BB962C8B-B14F-4D97-AF65-F5344CB8AC3E}">
+        <p14:creationId xmlns:p14="http://schemas.microsoft.com/office/powerpoint/2010/main" val="1360900344"/>
+      </p:ext>
+    </p:extLst>
+  </p:cSld>
+  <p:clrMapOvr>
+    <a:masterClrMapping/>
+  </p:clrMapOvr>
+</p:notes>
+</file>
+
+<file path=ppt/notesSlides/notesSlide6.xml><?xml version="1.0" encoding="utf-8"?>
+<p:notes xmlns:a="http://schemas.openxmlformats.org/drawingml/2006/main" xmlns:r="http://schemas.openxmlformats.org/officeDocument/2006/relationships" xmlns:p="http://schemas.openxmlformats.org/presentationml/2006/main">
+  <p:cSld>
+    <p:spTree>
+      <p:nvGrpSpPr>
+        <p:cNvPr id="1" name=""/>
+        <p:cNvGrpSpPr/>
+        <p:nvPr/>
+      </p:nvGrpSpPr>
+      <p:grpSpPr>
+        <a:xfrm>
+          <a:off x="0" y="0"/>
+          <a:ext cx="0" cy="0"/>
+          <a:chOff x="0" y="0"/>
+          <a:chExt cx="0" cy="0"/>
+        </a:xfrm>
+      </p:grpSpPr>
+      <p:sp>
+        <p:nvSpPr>
+          <p:cNvPr id="2" name="Slide Image Placeholder 1"/>
+          <p:cNvSpPr>
+            <a:spLocks noGrp="1" noRot="1" noChangeAspect="1"/>
+          </p:cNvSpPr>
+          <p:nvPr>
+            <p:ph type="sldImg"/>
+          </p:nvPr>
+        </p:nvSpPr>
+        <p:spPr/>
+      </p:sp>
+      <p:sp>
+        <p:nvSpPr>
+          <p:cNvPr id="3" name="Notes Placeholder 2"/>
+          <p:cNvSpPr>
+            <a:spLocks noGrp="1"/>
+          </p:cNvSpPr>
+          <p:nvPr>
+            <p:ph type="body" idx="1"/>
+          </p:nvPr>
+        </p:nvSpPr>
+        <p:spPr/>
+        <p:txBody>
+          <a:bodyPr/>
+          <a:lstStyle/>
+          <a:p>
+            <a:r>
+              <a:rPr lang="en-US" dirty="0" smtClean="0"/>
               <a:t>(levers or pulleys)</a:t>
             </a:r>
             <a:endParaRPr lang="en-US" dirty="0"/>
@@ -1486,7 +1558,15 @@
             <p:ph type="sldNum" sz="quarter" idx="10"/>
           </p:nvPr>
         </p:nvSpPr>
-        <p:spPr/>
+        <p:spPr>
+          <a:xfrm>
+            <a:off x="3884613" y="8831263"/>
+            <a:ext cx="2971800" cy="463550"/>
+          </a:xfrm>
+          <a:prstGeom prst="rect">
+            <a:avLst/>
+          </a:prstGeom>
+        </p:spPr>
         <p:txBody>
           <a:bodyPr/>
           <a:lstStyle/>
@@ -3689,18 +3769,9 @@
           <a:p>
             <a:r>
               <a:rPr lang="en-US" dirty="0" smtClean="0">
-                <a:hlinkClick r:id="rId2" action="ppaction://hlinksldjump"/>
+                <a:hlinkClick r:id="rId3" action="ppaction://hlinksldjump"/>
               </a:rPr>
               <a:t>Motivation</a:t>
-            </a:r>
-            <a:endParaRPr lang="en-US" dirty="0" smtClean="0"/>
-          </a:p>
-          <a:p>
-            <a:r>
-              <a:rPr lang="en-US" dirty="0" smtClean="0">
-                <a:hlinkClick r:id="rId3" action="ppaction://hlinksldjump"/>
-              </a:rPr>
-              <a:t>Capstone Ideas</a:t>
             </a:r>
             <a:endParaRPr lang="en-US" dirty="0" smtClean="0"/>
           </a:p>
@@ -3709,7 +3780,7 @@
               <a:rPr lang="en-US" dirty="0" smtClean="0">
                 <a:hlinkClick r:id="rId4" action="ppaction://hlinksldjump"/>
               </a:rPr>
-              <a:t>Short Walk to the Edge of Knowledge</a:t>
+              <a:t>Capstone Ideas</a:t>
             </a:r>
             <a:endParaRPr lang="en-US" dirty="0" smtClean="0"/>
           </a:p>
@@ -3718,7 +3789,7 @@
               <a:rPr lang="en-US" dirty="0" smtClean="0">
                 <a:hlinkClick r:id="rId5" action="ppaction://hlinksldjump"/>
               </a:rPr>
-              <a:t>Evolution vs Big Leaps</a:t>
+              <a:t>Short Walk to the Edge of Knowledge</a:t>
             </a:r>
             <a:endParaRPr lang="en-US" dirty="0" smtClean="0"/>
           </a:p>
@@ -3727,7 +3798,7 @@
               <a:rPr lang="en-US" dirty="0" smtClean="0">
                 <a:hlinkClick r:id="rId6" action="ppaction://hlinksldjump"/>
               </a:rPr>
-              <a:t>Context powers Innovation</a:t>
+              <a:t>Evolution vs Big Leaps</a:t>
             </a:r>
             <a:endParaRPr lang="en-US" dirty="0" smtClean="0"/>
           </a:p>
@@ -3736,18 +3807,27 @@
               <a:rPr lang="en-US" dirty="0" smtClean="0">
                 <a:hlinkClick r:id="rId7" action="ppaction://hlinksldjump"/>
               </a:rPr>
-              <a:t>Diverse network – be a node</a:t>
-            </a:r>
-            <a:r>
-              <a:rPr lang="en-US" dirty="0" smtClean="0"/>
-              <a:t>!</a:t>
-            </a:r>
+              <a:t>Context powers Innovation</a:t>
+            </a:r>
+            <a:endParaRPr lang="en-US" dirty="0" smtClean="0"/>
           </a:p>
           <a:p>
             <a:r>
               <a:rPr lang="en-US" dirty="0" smtClean="0">
                 <a:hlinkClick r:id="rId8" action="ppaction://hlinksldjump"/>
               </a:rPr>
+              <a:t>Diverse network – be a node</a:t>
+            </a:r>
+            <a:r>
+              <a:rPr lang="en-US" dirty="0" smtClean="0"/>
+              <a:t>!</a:t>
+            </a:r>
+          </a:p>
+          <a:p>
+            <a:r>
+              <a:rPr lang="en-US" dirty="0" smtClean="0">
+                <a:hlinkClick r:id="rId9" action="ppaction://hlinksldjump"/>
+              </a:rPr>
               <a:t>Mass production</a:t>
             </a:r>
             <a:endParaRPr lang="en-US" dirty="0" smtClean="0"/>
@@ -3763,7 +3843,7 @@
             </a:r>
             <a:r>
               <a:rPr lang="en-US" dirty="0">
-                <a:hlinkClick r:id="rId9" action="ppaction://hlinksldjump"/>
+                <a:hlinkClick r:id="rId10" action="ppaction://hlinksldjump"/>
               </a:rPr>
               <a:t>jigs</a:t>
             </a:r>
@@ -3779,7 +3859,7 @@
           <a:p>
             <a:r>
               <a:rPr lang="en-US" dirty="0" smtClean="0">
-                <a:hlinkClick r:id="rId10" action="ppaction://hlinksldjump"/>
+                <a:hlinkClick r:id="rId11" action="ppaction://hlinksldjump"/>
               </a:rPr>
               <a:t>The best designers</a:t>
             </a:r>
@@ -6458,11 +6538,7 @@
           <a:p>
             <a:r>
               <a:rPr lang="en-US" sz="2400" dirty="0" smtClean="0"/>
-              <a:t>Engineered Parametric Drawing (given flow rate it can draw a municipal water treatment plant</a:t>
-            </a:r>
-            <a:r>
-              <a:rPr lang="en-US" sz="2400" dirty="0" smtClean="0"/>
-              <a:t>)</a:t>
+              <a:t>Engineered Parametric Drawing (given flow rate it can draw a municipal water treatment plant)</a:t>
             </a:r>
           </a:p>
           <a:p>
@@ -6474,7 +6550,6 @@
               <a:rPr lang="en-US" sz="2400" dirty="0" smtClean="0"/>
               <a:t>!</a:t>
             </a:r>
-            <a:endParaRPr lang="en-US" sz="2400" dirty="0" smtClean="0"/>
           </a:p>
           <a:p>
             <a:endParaRPr lang="en-US" sz="2400" dirty="0" smtClean="0"/>
@@ -6729,11 +6804,7 @@
           <a:p>
             <a:r>
               <a:rPr lang="en-US" dirty="0" smtClean="0"/>
-              <a:t>What will motivate you to get up and go to work every weekday morning</a:t>
-            </a:r>
-            <a:r>
-              <a:rPr lang="en-US" dirty="0" smtClean="0"/>
-              <a:t>?</a:t>
+              <a:t>What will motivate you to get up and go to work every weekday morning?</a:t>
             </a:r>
           </a:p>
           <a:p>
@@ -6741,7 +6812,6 @@
               <a:rPr lang="en-US" dirty="0" smtClean="0"/>
               <a:t>What kind of capstone design project do you want to do?</a:t>
             </a:r>
-            <a:endParaRPr lang="en-US" dirty="0" smtClean="0"/>
           </a:p>
         </p:txBody>
       </p:sp>
@@ -8713,11 +8783,7 @@
           <a:p>
             <a:r>
               <a:rPr lang="en-US" dirty="0" smtClean="0"/>
-              <a:t>Don’t assume a constraint is set in </a:t>
-            </a:r>
-            <a:r>
-              <a:rPr lang="en-US" dirty="0" smtClean="0"/>
-              <a:t>stone</a:t>
+              <a:t>Don’t assume a constraint is set in stone</a:t>
             </a:r>
           </a:p>
           <a:p>
@@ -8726,7 +8792,6 @@
               <a:rPr lang="en-US" dirty="0" smtClean="0"/>
               <a:t>Exploring options quickly – fail fast!</a:t>
             </a:r>
-            <a:endParaRPr lang="en-US" dirty="0" smtClean="0"/>
           </a:p>
           <a:p>
             <a:endParaRPr lang="en-US" dirty="0"/>
@@ -8785,11 +8850,7 @@
           <a:p>
             <a:r>
               <a:rPr lang="en-US" dirty="0" smtClean="0"/>
-              <a:t>…create </a:t>
-            </a:r>
-            <a:r>
-              <a:rPr lang="en-US" dirty="0" smtClean="0"/>
-              <a:t>with geometry</a:t>
+              <a:t>…create with geometry</a:t>
             </a:r>
             <a:endParaRPr lang="en-US" dirty="0"/>
           </a:p>
@@ -8916,11 +8977,7 @@
           <a:p>
             <a:r>
               <a:rPr lang="en-US" dirty="0" smtClean="0"/>
-              <a:t>…use </a:t>
-            </a:r>
-            <a:r>
-              <a:rPr lang="en-US" dirty="0" smtClean="0"/>
-              <a:t>tools</a:t>
+              <a:t>…use tools</a:t>
             </a:r>
             <a:endParaRPr lang="en-US" dirty="0"/>
           </a:p>
@@ -9015,11 +9072,7 @@
           <a:p>
             <a:r>
               <a:rPr lang="en-US" dirty="0" smtClean="0"/>
-              <a:t>…write </a:t>
-            </a:r>
-            <a:r>
-              <a:rPr lang="en-US" dirty="0" smtClean="0"/>
-              <a:t>in </a:t>
+              <a:t>…write in </a:t>
             </a:r>
             <a:r>
               <a:rPr lang="en-US" dirty="0" err="1" smtClean="0"/>
@@ -9056,32 +9109,19 @@
           <a:p>
             <a:r>
               <a:rPr lang="en-US" dirty="0" smtClean="0"/>
-              <a:t>Include </a:t>
-            </a:r>
-            <a:r>
-              <a:rPr lang="en-US" dirty="0" smtClean="0"/>
-              <a:t>sketches, equations, comparisons</a:t>
-            </a:r>
-            <a:endParaRPr lang="en-US" dirty="0" smtClean="0"/>
-          </a:p>
-          <a:p>
-            <a:r>
-              <a:rPr lang="en-US" dirty="0" smtClean="0"/>
-              <a:t>Spell </a:t>
-            </a:r>
-            <a:r>
-              <a:rPr lang="en-US" dirty="0" smtClean="0"/>
-              <a:t>check</a:t>
-            </a:r>
-          </a:p>
-          <a:p>
-            <a:r>
-              <a:rPr lang="en-US" dirty="0" smtClean="0"/>
-              <a:t>Make sure someone from your team proofreads the entire document before </a:t>
-            </a:r>
-            <a:r>
-              <a:rPr lang="en-US" dirty="0" smtClean="0"/>
-              <a:t>submission</a:t>
+              <a:t>Include sketches, equations, comparisons</a:t>
+            </a:r>
+          </a:p>
+          <a:p>
+            <a:r>
+              <a:rPr lang="en-US" dirty="0" smtClean="0"/>
+              <a:t>Spell check</a:t>
+            </a:r>
+          </a:p>
+          <a:p>
+            <a:r>
+              <a:rPr lang="en-US" dirty="0" smtClean="0"/>
+              <a:t>Make sure someone from your team proofreads the entire document before submission</a:t>
             </a:r>
           </a:p>
           <a:p>
@@ -9097,7 +9137,6 @@
               <a:rPr lang="en-US" dirty="0" smtClean="0"/>
               <a:t>layout</a:t>
             </a:r>
-            <a:endParaRPr lang="en-US" dirty="0" smtClean="0"/>
           </a:p>
           <a:p>
             <a:endParaRPr lang="en-US" dirty="0"/>
@@ -9156,11 +9195,7 @@
           <a:p>
             <a:r>
               <a:rPr lang="en-US" dirty="0" smtClean="0"/>
-              <a:t>Previous Capstone </a:t>
-            </a:r>
-            <a:r>
-              <a:rPr lang="en-US" dirty="0" smtClean="0"/>
-              <a:t>Ideas</a:t>
+              <a:t>Previous Capstone Ideas</a:t>
             </a:r>
             <a:endParaRPr lang="en-US" dirty="0"/>
           </a:p>
@@ -9320,11 +9355,7 @@
           <a:p>
             <a:r>
               <a:rPr lang="en-US" dirty="0" smtClean="0"/>
-              <a:t>3 New </a:t>
-            </a:r>
-            <a:r>
-              <a:rPr lang="en-US" dirty="0" smtClean="0"/>
-              <a:t>initiatives</a:t>
+              <a:t>3 New initiatives</a:t>
             </a:r>
             <a:endParaRPr lang="en-US" dirty="0"/>
           </a:p>
@@ -9349,7 +9380,6 @@
               <a:rPr lang="en-US" sz="2800" dirty="0" smtClean="0"/>
               <a:t>Create a plan to provide safe water to small communities in </a:t>
             </a:r>
-            <a:endParaRPr lang="en-US" sz="2800" dirty="0" smtClean="0"/>
           </a:p>
           <a:p>
             <a:pPr lvl="1"/>
@@ -9931,11 +9961,7 @@
           <a:p>
             <a:r>
               <a:rPr lang="en-US" dirty="0" smtClean="0"/>
-              <a:t>Dramatic </a:t>
-            </a:r>
-            <a:r>
-              <a:rPr lang="en-US" dirty="0" smtClean="0"/>
-              <a:t>changes in design targets (</a:t>
+              <a:t>Dramatic changes in design targets (</a:t>
             </a:r>
             <a:r>
               <a:rPr lang="en-US" dirty="0" err="1" smtClean="0"/>
@@ -9993,7 +10019,6 @@
               <a:rPr lang="en-US" dirty="0" smtClean="0"/>
               <a:t>Try extreme conditions and learn what fails or perhaps find unexpected success!</a:t>
             </a:r>
-            <a:endParaRPr lang="en-US" dirty="0" smtClean="0"/>
           </a:p>
         </p:txBody>
       </p:sp>
@@ -10089,15 +10114,7 @@
           <a:p>
             <a:r>
               <a:rPr lang="en-US" dirty="0" smtClean="0"/>
-              <a:t>Then </a:t>
-            </a:r>
-            <a:r>
-              <a:rPr lang="en-US" dirty="0" smtClean="0"/>
-              <a:t>question </a:t>
-            </a:r>
-            <a:r>
-              <a:rPr lang="en-US" dirty="0" smtClean="0"/>
-              <a:t>it all and proceed to Invent</a:t>
+              <a:t>Then question it all and proceed to Invent</a:t>
             </a:r>
             <a:endParaRPr lang="en-US" dirty="0"/>
           </a:p>

</xml_diff>